<commit_message>
format sound-valid.pptx, comment PS_cases_sum_of_squares
</commit_message>
<xml_diff>
--- a/spring17/slidesS17/sound-valid.pptx
+++ b/spring17/slidesS17/sound-valid.pptx
@@ -1198,8 +1198,8 @@
         </p:nvSpPr>
         <p:spPr>
           <a:xfrm>
-            <a:off x="7963948" y="6553200"/>
-            <a:ext cx="1180056" cy="276999"/>
+            <a:off x="8267141" y="6553200"/>
+            <a:ext cx="876863" cy="276999"/>
           </a:xfrm>
           <a:ln/>
         </p:spPr>
@@ -1216,7 +1216,7 @@
             </a:pPr>
             <a:r>
               <a:rPr lang="en-US" dirty="0" smtClean="0"/>
-              <a:t>IMPLIES..</a:t>
+              <a:t>sound.</a:t>
             </a:r>
             <a:fld id="{C3C9801B-391E-452B-A4C3-BC5EC51A0BC7}" type="slidenum">
               <a:rPr lang="en-US" smtClean="0"/>
@@ -1368,6 +1368,13 @@
   <p:transition xmlns:p14="http://schemas.microsoft.com/office/powerpoint/2010/main" spd="slow" advClick="0">
     <p:fade/>
   </p:transition>
+  <p:timing>
+    <p:tnLst>
+      <p:par>
+        <p:cTn xmlns:p14="http://schemas.microsoft.com/office/powerpoint/2010/main" id="1" dur="indefinite" restart="never" nodeType="tmRoot"/>
+      </p:par>
+    </p:tnLst>
+  </p:timing>
 </p:sldLayout>
 </file>
 
@@ -1532,6 +1539,13 @@
   <p:transition xmlns:p14="http://schemas.microsoft.com/office/powerpoint/2010/main" spd="slow" advClick="0">
     <p:fade/>
   </p:transition>
+  <p:timing>
+    <p:tnLst>
+      <p:par>
+        <p:cTn xmlns:p14="http://schemas.microsoft.com/office/powerpoint/2010/main" id="1" dur="indefinite" restart="never" nodeType="tmRoot"/>
+      </p:par>
+    </p:tnLst>
+  </p:timing>
 </p:sldLayout>
 </file>
 
@@ -1792,6 +1806,13 @@
   <p:transition xmlns:p14="http://schemas.microsoft.com/office/powerpoint/2010/main" spd="slow" advClick="0">
     <p:fade/>
   </p:transition>
+  <p:timing>
+    <p:tnLst>
+      <p:par>
+        <p:cTn xmlns:p14="http://schemas.microsoft.com/office/powerpoint/2010/main" id="1" dur="indefinite" restart="never" nodeType="tmRoot"/>
+      </p:par>
+    </p:tnLst>
+  </p:timing>
 </p:sldLayout>
 </file>
 
@@ -2191,6 +2212,13 @@
   <p:transition xmlns:p14="http://schemas.microsoft.com/office/powerpoint/2010/main" spd="slow" advClick="0">
     <p:fade/>
   </p:transition>
+  <p:timing>
+    <p:tnLst>
+      <p:par>
+        <p:cTn xmlns:p14="http://schemas.microsoft.com/office/powerpoint/2010/main" id="1" dur="indefinite" restart="never" nodeType="tmRoot"/>
+      </p:par>
+    </p:tnLst>
+  </p:timing>
 </p:sldLayout>
 </file>
 
@@ -2285,6 +2313,13 @@
   <p:transition xmlns:p14="http://schemas.microsoft.com/office/powerpoint/2010/main" spd="slow" advClick="0">
     <p:fade/>
   </p:transition>
+  <p:timing>
+    <p:tnLst>
+      <p:par>
+        <p:cTn xmlns:p14="http://schemas.microsoft.com/office/powerpoint/2010/main" id="1" dur="indefinite" restart="never" nodeType="tmRoot"/>
+      </p:par>
+    </p:tnLst>
+  </p:timing>
 </p:sldLayout>
 </file>
 
@@ -2352,6 +2387,13 @@
   <p:transition xmlns:p14="http://schemas.microsoft.com/office/powerpoint/2010/main" spd="slow" advClick="0">
     <p:fade/>
   </p:transition>
+  <p:timing>
+    <p:tnLst>
+      <p:par>
+        <p:cTn xmlns:p14="http://schemas.microsoft.com/office/powerpoint/2010/main" id="1" dur="indefinite" restart="never" nodeType="tmRoot"/>
+      </p:par>
+    </p:tnLst>
+  </p:timing>
 </p:sldLayout>
 </file>
 
@@ -2827,6 +2869,13 @@
   <p:transition xmlns:p14="http://schemas.microsoft.com/office/powerpoint/2010/main" spd="slow" advClick="0">
     <p:fade/>
   </p:transition>
+  <p:timing>
+    <p:tnLst>
+      <p:par>
+        <p:cTn xmlns:p14="http://schemas.microsoft.com/office/powerpoint/2010/main" id="1" dur="indefinite" restart="never" nodeType="tmRoot"/>
+      </p:par>
+    </p:tnLst>
+  </p:timing>
 </p:sldLayout>
 </file>
 
@@ -2969,6 +3018,13 @@
   <p:transition xmlns:p14="http://schemas.microsoft.com/office/powerpoint/2010/main" spd="slow" advClick="0">
     <p:fade/>
   </p:transition>
+  <p:timing>
+    <p:tnLst>
+      <p:par>
+        <p:cTn xmlns:p14="http://schemas.microsoft.com/office/powerpoint/2010/main" id="1" dur="indefinite" restart="never" nodeType="tmRoot"/>
+      </p:par>
+    </p:tnLst>
+  </p:timing>
 </p:sldLayout>
 </file>
 
@@ -3121,6 +3177,13 @@
   <p:transition xmlns:p14="http://schemas.microsoft.com/office/powerpoint/2010/main" spd="slow" advClick="0">
     <p:fade/>
   </p:transition>
+  <p:timing>
+    <p:tnLst>
+      <p:par>
+        <p:cTn xmlns:p14="http://schemas.microsoft.com/office/powerpoint/2010/main" id="1" dur="indefinite" restart="never" nodeType="tmRoot"/>
+      </p:par>
+    </p:tnLst>
+  </p:timing>
 </p:sldLayout>
 </file>
 
@@ -3228,8 +3291,8 @@
         </p:nvSpPr>
         <p:spPr>
           <a:xfrm>
-            <a:off x="7963948" y="6553200"/>
-            <a:ext cx="1180056" cy="276999"/>
+            <a:off x="8267141" y="6553200"/>
+            <a:ext cx="876863" cy="276999"/>
           </a:xfrm>
           <a:ln/>
         </p:spPr>
@@ -3246,7 +3309,7 @@
             </a:pPr>
             <a:r>
               <a:rPr lang="en-US" dirty="0" smtClean="0"/>
-              <a:t>IMPLIES..</a:t>
+              <a:t>sound.</a:t>
             </a:r>
             <a:fld id="{A528ADE2-B74F-4D9D-8D04-FB5D781EAB51}" type="slidenum">
               <a:rPr lang="en-US" smtClean="0"/>
@@ -3403,8 +3466,8 @@
         </p:nvSpPr>
         <p:spPr>
           <a:xfrm>
-            <a:off x="7963948" y="6553200"/>
-            <a:ext cx="1180056" cy="276999"/>
+            <a:off x="8267141" y="6553200"/>
+            <a:ext cx="876863" cy="276999"/>
           </a:xfrm>
           <a:ln/>
         </p:spPr>
@@ -3421,7 +3484,7 @@
             </a:pPr>
             <a:r>
               <a:rPr lang="en-US" dirty="0" smtClean="0"/>
-              <a:t>IMPLIES..</a:t>
+              <a:t>sound.</a:t>
             </a:r>
             <a:fld id="{B3A503E6-B8FE-4B0A-9976-9CA65DFEA87E}" type="slidenum">
               <a:rPr lang="en-US" smtClean="0"/>
@@ -3508,8 +3571,8 @@
         </p:nvSpPr>
         <p:spPr>
           <a:xfrm>
-            <a:off x="7963948" y="6553200"/>
-            <a:ext cx="1180056" cy="276999"/>
+            <a:off x="8267141" y="6553200"/>
+            <a:ext cx="876863" cy="276999"/>
           </a:xfrm>
           <a:ln/>
         </p:spPr>
@@ -3526,7 +3589,7 @@
             </a:pPr>
             <a:r>
               <a:rPr lang="en-US" dirty="0" smtClean="0"/>
-              <a:t>IMPLIES..</a:t>
+              <a:t>sound.</a:t>
             </a:r>
             <a:fld id="{DB6F0ED6-FEF5-4C9C-B1CC-29B47EC66FAA}" type="slidenum">
               <a:rPr lang="en-US" smtClean="0"/>
@@ -3547,6 +3610,13 @@
   <p:transition xmlns:p14="http://schemas.microsoft.com/office/powerpoint/2010/main" spd="slow" advClick="0">
     <p:fade/>
   </p:transition>
+  <p:timing>
+    <p:tnLst>
+      <p:par>
+        <p:cTn xmlns:p14="http://schemas.microsoft.com/office/powerpoint/2010/main" id="1" dur="indefinite" restart="never" nodeType="tmRoot"/>
+      </p:par>
+    </p:tnLst>
+  </p:timing>
 </p:sldLayout>
 </file>
 
@@ -3579,8 +3649,8 @@
         </p:nvSpPr>
         <p:spPr>
           <a:xfrm>
-            <a:off x="7963948" y="6553200"/>
-            <a:ext cx="1180056" cy="276999"/>
+            <a:off x="8267141" y="6553200"/>
+            <a:ext cx="876863" cy="276999"/>
           </a:xfrm>
           <a:ln/>
         </p:spPr>
@@ -3597,7 +3667,7 @@
             </a:pPr>
             <a:r>
               <a:rPr lang="en-US" dirty="0" smtClean="0"/>
-              <a:t>IMPLIES..</a:t>
+              <a:t>sound.</a:t>
             </a:r>
             <a:fld id="{7D4651B8-09C8-4A4D-BE8E-31B6C97A420D}" type="slidenum">
               <a:rPr lang="en-US" smtClean="0"/>
@@ -3816,8 +3886,8 @@
         </p:nvSpPr>
         <p:spPr>
           <a:xfrm>
-            <a:off x="7963948" y="6553200"/>
-            <a:ext cx="1180056" cy="276999"/>
+            <a:off x="8175169" y="6553200"/>
+            <a:ext cx="968835" cy="276999"/>
           </a:xfrm>
           <a:ln/>
         </p:spPr>
@@ -3834,7 +3904,7 @@
             </a:pPr>
             <a:r>
               <a:rPr lang="en-US" dirty="0" smtClean="0"/>
-              <a:t>IMPLIES..</a:t>
+              <a:t>  sound.</a:t>
             </a:r>
             <a:fld id="{85BC747C-4E6E-462A-A001-3C1CA56269DD}" type="slidenum">
               <a:rPr lang="en-US" smtClean="0"/>
@@ -3855,6 +3925,13 @@
   <p:transition xmlns:p14="http://schemas.microsoft.com/office/powerpoint/2010/main" spd="slow" advClick="0">
     <p:fade/>
   </p:transition>
+  <p:timing>
+    <p:tnLst>
+      <p:par>
+        <p:cTn xmlns:p14="http://schemas.microsoft.com/office/powerpoint/2010/main" id="1" dur="indefinite" restart="never" nodeType="tmRoot"/>
+      </p:par>
+    </p:tnLst>
+  </p:timing>
 </p:sldLayout>
 </file>
 
@@ -4029,8 +4106,8 @@
         </p:nvSpPr>
         <p:spPr>
           <a:xfrm>
-            <a:off x="7963948" y="6553200"/>
-            <a:ext cx="1180056" cy="276999"/>
+            <a:off x="8267141" y="6553200"/>
+            <a:ext cx="876863" cy="276999"/>
           </a:xfrm>
           <a:ln/>
         </p:spPr>
@@ -4047,7 +4124,7 @@
             </a:pPr>
             <a:r>
               <a:rPr lang="en-US" dirty="0" smtClean="0"/>
-              <a:t>IMPLIES..</a:t>
+              <a:t>sound.</a:t>
             </a:r>
             <a:fld id="{B7856ECB-7BA5-4EA4-A170-7A96316AE30B}" type="slidenum">
               <a:rPr lang="en-US" smtClean="0"/>
@@ -4068,6 +4145,13 @@
   <p:transition xmlns:p14="http://schemas.microsoft.com/office/powerpoint/2010/main" spd="slow" advClick="0">
     <p:fade/>
   </p:transition>
+  <p:timing>
+    <p:tnLst>
+      <p:par>
+        <p:cTn xmlns:p14="http://schemas.microsoft.com/office/powerpoint/2010/main" id="1" dur="indefinite" restart="never" nodeType="tmRoot"/>
+      </p:par>
+    </p:tnLst>
+  </p:timing>
 </p:sldLayout>
 </file>
 
@@ -4347,6 +4431,13 @@
   <p:transition xmlns:p14="http://schemas.microsoft.com/office/powerpoint/2010/main" spd="slow" advClick="0">
     <p:fade/>
   </p:transition>
+  <p:timing>
+    <p:tnLst>
+      <p:par>
+        <p:cTn xmlns:p14="http://schemas.microsoft.com/office/powerpoint/2010/main" id="1" dur="indefinite" restart="never" nodeType="tmRoot"/>
+      </p:par>
+    </p:tnLst>
+  </p:timing>
 </p:sldLayout>
 </file>
 
@@ -4471,6 +4562,10 @@
           </p:nvPr>
         </p:nvSpPr>
         <p:spPr>
+          <a:xfrm>
+            <a:off x="8373762" y="6553200"/>
+            <a:ext cx="770238" cy="276999"/>
+          </a:xfrm>
           <a:ln/>
         </p:spPr>
         <p:txBody>
@@ -4486,7 +4581,7 @@
             </a:pPr>
             <a:r>
               <a:rPr lang="en-US" dirty="0" smtClean="0"/>
-              <a:t>IMPLIES.</a:t>
+              <a:t>sound.</a:t>
             </a:r>
             <a:fld id="{671A9335-2B28-465B-823D-6F18B2E54319}" type="slidenum">
               <a:rPr lang="en-US" smtClean="0"/>
@@ -4507,6 +4602,13 @@
   <p:transition xmlns:p14="http://schemas.microsoft.com/office/powerpoint/2010/main" spd="slow" advClick="0">
     <p:fade/>
   </p:transition>
+  <p:timing>
+    <p:tnLst>
+      <p:par>
+        <p:cTn xmlns:p14="http://schemas.microsoft.com/office/powerpoint/2010/main" id="1" dur="indefinite" restart="never" nodeType="tmRoot"/>
+      </p:par>
+    </p:tnLst>
+  </p:timing>
 </p:sldLayout>
 </file>
 
@@ -4743,13 +4845,25 @@
               <a:rPr lang="en-US" sz="1100" baseline="0" dirty="0" smtClean="0">
                 <a:latin typeface="Comic Sans MS" pitchFamily="66" charset="0"/>
               </a:rPr>
-              <a:t>February 15</a:t>
+              <a:t>February </a:t>
+            </a:r>
+            <a:r>
+              <a:rPr lang="en-US" sz="1100" baseline="0" dirty="0" smtClean="0">
+                <a:latin typeface="Comic Sans MS" pitchFamily="66" charset="0"/>
+              </a:rPr>
+              <a:t>17</a:t>
             </a:r>
             <a:r>
               <a:rPr lang="en-US" sz="1100" dirty="0" smtClean="0">
                 <a:latin typeface="Comic Sans MS" pitchFamily="66" charset="0"/>
               </a:rPr>
-              <a:t>, 2017</a:t>
+              <a:t>, </a:t>
+            </a:r>
+            <a:r>
+              <a:rPr lang="en-US" sz="1100" dirty="0" smtClean="0">
+                <a:latin typeface="Comic Sans MS" pitchFamily="66" charset="0"/>
+              </a:rPr>
+              <a:t>2017</a:t>
             </a:r>
             <a:endParaRPr lang="en-US" sz="1100" dirty="0">
               <a:latin typeface="Comic Sans MS" pitchFamily="66" charset="0"/>
@@ -5320,8 +5434,8 @@
         </p:nvSpPr>
         <p:spPr bwMode="auto">
           <a:xfrm>
-            <a:off x="8142930" y="6553200"/>
-            <a:ext cx="1001070" cy="276999"/>
+            <a:off x="8373762" y="6553200"/>
+            <a:ext cx="770238" cy="276999"/>
           </a:xfrm>
           <a:prstGeom prst="rect">
             <a:avLst/>
@@ -5353,7 +5467,7 @@
             </a:pPr>
             <a:r>
               <a:rPr lang="en-US" dirty="0" smtClean="0"/>
-              <a:t>IMPLIES.</a:t>
+              <a:t>sound.</a:t>
             </a:r>
             <a:fld id="{2CE11749-3435-4A3E-A162-33970963D098}" type="slidenum">
               <a:rPr lang="en-US" smtClean="0"/>
@@ -5980,8 +6094,8 @@
         </p:nvSpPr>
         <p:spPr>
           <a:xfrm>
-            <a:off x="8180050" y="6553200"/>
-            <a:ext cx="963951" cy="276999"/>
+            <a:off x="8444921" y="6553200"/>
+            <a:ext cx="699080" cy="276999"/>
           </a:xfrm>
           <a:noFill/>
         </p:spPr>
@@ -5990,8 +6104,8 @@
           <a:lstStyle/>
           <a:p>
             <a:r>
-              <a:rPr lang="en-US" dirty="0" smtClean="0"/>
-              <a:t>IMPLIES.</a:t>
+              <a:rPr lang="en-US" dirty="0"/>
+              <a:t>sound.</a:t>
             </a:r>
             <a:fld id="{0150943C-9303-41DF-A6FA-7E32D6C5D18E}" type="slidenum">
               <a:rPr lang="en-US" smtClean="0"/>
@@ -6348,8 +6462,8 @@
         </p:nvSpPr>
         <p:spPr>
           <a:xfrm>
-            <a:off x="8155404" y="6553200"/>
-            <a:ext cx="988597" cy="276999"/>
+            <a:off x="8420275" y="6553200"/>
+            <a:ext cx="723726" cy="276999"/>
           </a:xfrm>
         </p:spPr>
         <p:txBody>
@@ -6357,8 +6471,8 @@
           <a:lstStyle/>
           <a:p>
             <a:r>
-              <a:rPr lang="en-US" dirty="0" smtClean="0"/>
-              <a:t>IMPLIES.</a:t>
+              <a:rPr lang="en-US" dirty="0"/>
+              <a:t>sound.</a:t>
             </a:r>
             <a:fld id="{3251DA95-B240-47FE-901D-B78FC8E8E532}" type="slidenum">
               <a:rPr lang="en-US" smtClean="0"/>
@@ -6447,8 +6561,8 @@
         </p:nvSpPr>
         <p:spPr>
           <a:xfrm>
-            <a:off x="8117085" y="6553200"/>
-            <a:ext cx="1026919" cy="276999"/>
+            <a:off x="8420278" y="6553200"/>
+            <a:ext cx="723726" cy="276999"/>
           </a:xfrm>
         </p:spPr>
         <p:txBody>
@@ -6460,7 +6574,7 @@
             </a:pPr>
             <a:r>
               <a:rPr lang="en-US" dirty="0" smtClean="0"/>
-              <a:t>IMPLIES..</a:t>
+              <a:t>sound.</a:t>
             </a:r>
             <a:fld id="{A528ADE2-B74F-4D9D-8D04-FB5D781EAB51}" type="slidenum">
               <a:rPr lang="en-US" smtClean="0"/>
@@ -6495,7 +6609,7 @@
           <a:graphicData uri="http://schemas.openxmlformats.org/presentationml/2006/ole">
             <mc:AlternateContent xmlns:mc="http://schemas.openxmlformats.org/markup-compatibility/2006">
               <mc:Choice xmlns:v="urn:schemas-microsoft-com:vml" Requires="v">
-                <p:oleObj spid="_x0000_s1127" name="Equation" r:id="rId3" imgW="1181100" imgH="495300" progId="Equation.DSMT4">
+                <p:oleObj spid="_x0000_s1134" name="Equation" r:id="rId3" imgW="1181100" imgH="495300" progId="Equation.DSMT4">
                   <p:embed/>
                 </p:oleObj>
               </mc:Choice>
@@ -6552,7 +6666,7 @@
           <a:graphicData uri="http://schemas.openxmlformats.org/presentationml/2006/ole">
             <mc:AlternateContent xmlns:mc="http://schemas.openxmlformats.org/markup-compatibility/2006">
               <mc:Choice xmlns:v="urn:schemas-microsoft-com:vml" Requires="v">
-                <p:oleObj spid="_x0000_s1128" name="Equation" r:id="rId5" imgW="762000" imgH="457200" progId="Equation.DSMT4">
+                <p:oleObj spid="_x0000_s1135" name="Equation" r:id="rId5" imgW="762000" imgH="457200" progId="Equation.DSMT4">
                   <p:embed/>
                 </p:oleObj>
               </mc:Choice>
@@ -6609,7 +6723,7 @@
           <a:graphicData uri="http://schemas.openxmlformats.org/presentationml/2006/ole">
             <mc:AlternateContent xmlns:mc="http://schemas.openxmlformats.org/markup-compatibility/2006">
               <mc:Choice xmlns:v="urn:schemas-microsoft-com:vml" Requires="v">
-                <p:oleObj spid="_x0000_s1129" name="Equation" r:id="rId7" imgW="444500" imgH="431800" progId="Equation.DSMT4">
+                <p:oleObj spid="_x0000_s1136" name="Equation" r:id="rId7" imgW="444500" imgH="431800" progId="Equation.DSMT4">
                   <p:embed/>
                 </p:oleObj>
               </mc:Choice>
@@ -6654,9 +6768,18 @@
   <p:clrMapOvr>
     <a:masterClrMapping/>
   </p:clrMapOvr>
-  <p:transition xmlns:p14="http://schemas.microsoft.com/office/powerpoint/2010/main" spd="slow" advClick="0">
-    <p:fade thruBlk="1"/>
-  </p:transition>
+  <mc:AlternateContent xmlns:mc="http://schemas.openxmlformats.org/markup-compatibility/2006">
+    <mc:Choice xmlns:p14="http://schemas.microsoft.com/office/powerpoint/2010/main" Requires="p14">
+      <p:transition spd="med" p14:dur="700" advClick="0">
+        <p:fade/>
+      </p:transition>
+    </mc:Choice>
+    <mc:Fallback>
+      <p:transition xmlns:p14="http://schemas.microsoft.com/office/powerpoint/2010/main" spd="med" advClick="0">
+        <p:fade/>
+      </p:transition>
+    </mc:Fallback>
+  </mc:AlternateContent>
   <p:timing>
     <p:tnLst>
       <p:par>
@@ -6910,8 +7033,8 @@
         </p:nvSpPr>
         <p:spPr>
           <a:xfrm>
-            <a:off x="8047805" y="6553200"/>
-            <a:ext cx="1096199" cy="276999"/>
+            <a:off x="8420278" y="6553200"/>
+            <a:ext cx="723726" cy="276999"/>
           </a:xfrm>
         </p:spPr>
         <p:txBody>
@@ -6923,7 +7046,7 @@
             </a:pPr>
             <a:r>
               <a:rPr lang="en-US" dirty="0" smtClean="0"/>
-              <a:t>IMPLIES..</a:t>
+              <a:t>sound.</a:t>
             </a:r>
             <a:fld id="{A528ADE2-B74F-4D9D-8D04-FB5D781EAB51}" type="slidenum">
               <a:rPr lang="en-US" smtClean="0"/>
@@ -7415,8 +7538,8 @@
         </p:nvSpPr>
         <p:spPr>
           <a:xfrm>
-            <a:off x="8072452" y="6553200"/>
-            <a:ext cx="1071552" cy="276999"/>
+            <a:off x="8420278" y="6553200"/>
+            <a:ext cx="723726" cy="276999"/>
           </a:xfrm>
         </p:spPr>
         <p:txBody>
@@ -7428,7 +7551,7 @@
             </a:pPr>
             <a:r>
               <a:rPr lang="en-US" dirty="0" smtClean="0"/>
-              <a:t>IMPLIES..</a:t>
+              <a:t>sound.</a:t>
             </a:r>
             <a:fld id="{A528ADE2-B74F-4D9D-8D04-FB5D781EAB51}" type="slidenum">
               <a:rPr lang="en-US" smtClean="0"/>
@@ -7945,8 +8068,8 @@
         </p:nvSpPr>
         <p:spPr>
           <a:xfrm>
-            <a:off x="8086124" y="6553200"/>
-            <a:ext cx="1057877" cy="276999"/>
+            <a:off x="8420275" y="6553200"/>
+            <a:ext cx="723726" cy="276999"/>
           </a:xfrm>
         </p:spPr>
         <p:txBody>
@@ -7954,8 +8077,8 @@
           <a:lstStyle/>
           <a:p>
             <a:r>
-              <a:rPr lang="en-US" dirty="0" smtClean="0"/>
-              <a:t>IMPLIES.</a:t>
+              <a:rPr lang="en-US" dirty="0"/>
+              <a:t>sound.</a:t>
             </a:r>
             <a:fld id="{3251DA95-B240-47FE-901D-B78FC8E8E532}" type="slidenum">
               <a:rPr lang="en-US" smtClean="0"/>

</xml_diff>

<commit_message>
typo FP_AND_circuit_shorter, color a word in sound-valid.pptx
</commit_message>
<xml_diff>
--- a/spring17/slidesS17/sound-valid.pptx
+++ b/spring17/slidesS17/sound-valid.pptx
@@ -11425,7 +11425,21 @@
           <a:p>
             <a:r>
               <a:rPr lang="en-US" sz="4800" dirty="0" smtClean="0"/>
-              <a:t>when every valid formula is </a:t>
+              <a:t>when </a:t>
+            </a:r>
+            <a:r>
+              <a:rPr lang="en-US" sz="4800" dirty="0" smtClean="0">
+                <a:solidFill>
+                  <a:schemeClr val="accent1">
+                    <a:lumMod val="50000"/>
+                  </a:schemeClr>
+                </a:solidFill>
+              </a:rPr>
+              <a:t>every</a:t>
+            </a:r>
+            <a:r>
+              <a:rPr lang="en-US" sz="4800" dirty="0" smtClean="0"/>
+              <a:t> valid formula is </a:t>
             </a:r>
           </a:p>
           <a:p>
@@ -11763,7 +11777,19 @@
           <a:p>
             <a:r>
               <a:rPr lang="en-US" sz="4800" dirty="0" smtClean="0"/>
-              <a:t>when every valid formula is </a:t>
+              <a:t>when </a:t>
+            </a:r>
+            <a:r>
+              <a:rPr lang="en-US" sz="4800" dirty="0" smtClean="0">
+                <a:solidFill>
+                  <a:srgbClr val="0000E5"/>
+                </a:solidFill>
+              </a:rPr>
+              <a:t>every</a:t>
+            </a:r>
+            <a:r>
+              <a:rPr lang="en-US" sz="4800" dirty="0" smtClean="0"/>
+              <a:t> valid formula is </a:t>
             </a:r>
           </a:p>
           <a:p>
@@ -12089,13 +12115,13 @@
   <p:clrMapOvr>
     <a:masterClrMapping/>
   </p:clrMapOvr>
-  <mc:AlternateContent xmlns:mc="http://schemas.openxmlformats.org/markup-compatibility/2006">
-    <mc:Choice xmlns:p14="http://schemas.microsoft.com/office/powerpoint/2010/main" Requires="p14">
+  <mc:AlternateContent xmlns:mc="http://schemas.openxmlformats.org/markup-compatibility/2006" xmlns:p14="http://schemas.microsoft.com/office/powerpoint/2010/main">
+    <mc:Choice Requires="p14">
       <p:transition spd="slow" p14:dur="1100" advClick="0">
         <p:fade/>
       </p:transition>
     </mc:Choice>
-    <mc:Fallback>
+    <mc:Fallback xmlns="">
       <p:transition xmlns:p14="http://schemas.microsoft.com/office/powerpoint/2010/main" spd="slow" advClick="0">
         <p:fade/>
       </p:transition>
@@ -16054,7 +16080,7 @@
           <a:graphicData uri="http://schemas.openxmlformats.org/presentationml/2006/ole">
             <mc:AlternateContent xmlns:mc="http://schemas.openxmlformats.org/markup-compatibility/2006">
               <mc:Choice xmlns:v="urn:schemas-microsoft-com:vml" Requires="v">
-                <p:oleObj spid="_x0000_s1183" name="Equation" r:id="rId3" imgW="762000" imgH="457200" progId="Equation.DSMT4">
+                <p:oleObj spid="_x0000_s1187" name="Equation" r:id="rId3" imgW="762000" imgH="457200" progId="Equation.DSMT4">
                   <p:embed/>
                 </p:oleObj>
               </mc:Choice>
@@ -16185,7 +16211,7 @@
           <a:graphicData uri="http://schemas.openxmlformats.org/presentationml/2006/ole">
             <mc:AlternateContent xmlns:mc="http://schemas.openxmlformats.org/markup-compatibility/2006">
               <mc:Choice xmlns:v="urn:schemas-microsoft-com:vml" Requires="v">
-                <p:oleObj spid="_x0000_s1184" name="Equation" r:id="rId5" imgW="1181100" imgH="495300" progId="Equation.DSMT4">
+                <p:oleObj spid="_x0000_s1188" name="Equation" r:id="rId5" imgW="1181100" imgH="495300" progId="Equation.DSMT4">
                   <p:embed/>
                 </p:oleObj>
               </mc:Choice>
@@ -16242,7 +16268,7 @@
           <a:graphicData uri="http://schemas.openxmlformats.org/presentationml/2006/ole">
             <mc:AlternateContent xmlns:mc="http://schemas.openxmlformats.org/markup-compatibility/2006">
               <mc:Choice xmlns:v="urn:schemas-microsoft-com:vml" Requires="v">
-                <p:oleObj spid="_x0000_s1185" name="Equation" r:id="rId7" imgW="444500" imgH="431800" progId="Equation.DSMT4">
+                <p:oleObj spid="_x0000_s1189" name="Equation" r:id="rId7" imgW="444500" imgH="431800" progId="Equation.DSMT4">
                   <p:embed/>
                 </p:oleObj>
               </mc:Choice>

</xml_diff>